<commit_message>
small change to ML presentation
</commit_message>
<xml_diff>
--- a/Machine Learning Projects/Machine_Learning_Internship_Promadent.pptx
+++ b/Machine Learning Projects/Machine_Learning_Internship_Promadent.pptx
@@ -122,6 +122,11 @@
       </a:defRPr>
     </a:lvl9pPr>
   </p:defaultTextStyle>
+  <p:extLst>
+    <p:ext uri="{EFAFB233-063F-42B5-8137-9DF3F51BA10A}">
+      <p15:sldGuideLst xmlns:p15="http://schemas.microsoft.com/office/powerpoint/2012/main"/>
+    </p:ext>
+  </p:extLst>
 </p:presentation>
 </file>
 
@@ -319,7 +324,7 @@
           <a:p>
             <a:fld id="{F81F0916-2CB0-CF4C-BC3B-D82614A192FF}" type="datetimeFigureOut">
               <a:rPr lang="en-US" smtClean="0"/>
-              <a:t>9/27/21</a:t>
+              <a:t>9/29/21</a:t>
             </a:fld>
             <a:endParaRPr lang="en-US"/>
           </a:p>
@@ -817,7 +822,7 @@
           <a:p>
             <a:fld id="{3D2C2ACD-6AEA-D843-8AF0-F80CB715BF95}" type="datetimeFigureOut">
               <a:rPr lang="en-US" smtClean="0"/>
-              <a:t>9/22/21</a:t>
+              <a:t>9/29/21</a:t>
             </a:fld>
             <a:endParaRPr lang="en-US"/>
           </a:p>
@@ -1015,7 +1020,7 @@
           <a:p>
             <a:fld id="{3D2C2ACD-6AEA-D843-8AF0-F80CB715BF95}" type="datetimeFigureOut">
               <a:rPr lang="en-US" smtClean="0"/>
-              <a:t>9/22/21</a:t>
+              <a:t>9/29/21</a:t>
             </a:fld>
             <a:endParaRPr lang="en-US"/>
           </a:p>
@@ -1223,7 +1228,7 @@
           <a:p>
             <a:fld id="{3D2C2ACD-6AEA-D843-8AF0-F80CB715BF95}" type="datetimeFigureOut">
               <a:rPr lang="en-US" smtClean="0"/>
-              <a:t>9/22/21</a:t>
+              <a:t>9/29/21</a:t>
             </a:fld>
             <a:endParaRPr lang="en-US"/>
           </a:p>
@@ -1421,7 +1426,7 @@
           <a:p>
             <a:fld id="{3D2C2ACD-6AEA-D843-8AF0-F80CB715BF95}" type="datetimeFigureOut">
               <a:rPr lang="en-US" smtClean="0"/>
-              <a:t>9/22/21</a:t>
+              <a:t>9/29/21</a:t>
             </a:fld>
             <a:endParaRPr lang="en-US"/>
           </a:p>
@@ -1696,7 +1701,7 @@
           <a:p>
             <a:fld id="{3D2C2ACD-6AEA-D843-8AF0-F80CB715BF95}" type="datetimeFigureOut">
               <a:rPr lang="en-US" smtClean="0"/>
-              <a:t>9/22/21</a:t>
+              <a:t>9/29/21</a:t>
             </a:fld>
             <a:endParaRPr lang="en-US"/>
           </a:p>
@@ -1961,7 +1966,7 @@
           <a:p>
             <a:fld id="{3D2C2ACD-6AEA-D843-8AF0-F80CB715BF95}" type="datetimeFigureOut">
               <a:rPr lang="en-US" smtClean="0"/>
-              <a:t>9/22/21</a:t>
+              <a:t>9/29/21</a:t>
             </a:fld>
             <a:endParaRPr lang="en-US"/>
           </a:p>
@@ -2373,7 +2378,7 @@
           <a:p>
             <a:fld id="{3D2C2ACD-6AEA-D843-8AF0-F80CB715BF95}" type="datetimeFigureOut">
               <a:rPr lang="en-US" smtClean="0"/>
-              <a:t>9/22/21</a:t>
+              <a:t>9/29/21</a:t>
             </a:fld>
             <a:endParaRPr lang="en-US"/>
           </a:p>
@@ -2514,7 +2519,7 @@
           <a:p>
             <a:fld id="{3D2C2ACD-6AEA-D843-8AF0-F80CB715BF95}" type="datetimeFigureOut">
               <a:rPr lang="en-US" smtClean="0"/>
-              <a:t>9/22/21</a:t>
+              <a:t>9/29/21</a:t>
             </a:fld>
             <a:endParaRPr lang="en-US"/>
           </a:p>
@@ -2627,7 +2632,7 @@
           <a:p>
             <a:fld id="{3D2C2ACD-6AEA-D843-8AF0-F80CB715BF95}" type="datetimeFigureOut">
               <a:rPr lang="en-US" smtClean="0"/>
-              <a:t>9/22/21</a:t>
+              <a:t>9/29/21</a:t>
             </a:fld>
             <a:endParaRPr lang="en-US"/>
           </a:p>
@@ -2938,7 +2943,7 @@
           <a:p>
             <a:fld id="{3D2C2ACD-6AEA-D843-8AF0-F80CB715BF95}" type="datetimeFigureOut">
               <a:rPr lang="en-US" smtClean="0"/>
-              <a:t>9/22/21</a:t>
+              <a:t>9/29/21</a:t>
             </a:fld>
             <a:endParaRPr lang="en-US"/>
           </a:p>
@@ -3226,7 +3231,7 @@
           <a:p>
             <a:fld id="{3D2C2ACD-6AEA-D843-8AF0-F80CB715BF95}" type="datetimeFigureOut">
               <a:rPr lang="en-US" smtClean="0"/>
-              <a:t>9/22/21</a:t>
+              <a:t>9/29/21</a:t>
             </a:fld>
             <a:endParaRPr lang="en-US"/>
           </a:p>
@@ -3467,7 +3472,7 @@
           <a:p>
             <a:fld id="{3D2C2ACD-6AEA-D843-8AF0-F80CB715BF95}" type="datetimeFigureOut">
               <a:rPr lang="en-US" smtClean="0"/>
-              <a:t>9/22/21</a:t>
+              <a:t>9/29/21</a:t>
             </a:fld>
             <a:endParaRPr lang="en-US"/>
           </a:p>
@@ -3929,7 +3934,27 @@
                   </a:schemeClr>
                 </a:solidFill>
               </a:rPr>
-              <a:t>Tooth Segmentation Internship</a:t>
+              <a:t>Tooth Segmentation </a:t>
+            </a:r>
+            <a:r>
+              <a:rPr lang="en-US">
+                <a:solidFill>
+                  <a:schemeClr val="bg1">
+                    <a:lumMod val="85000"/>
+                  </a:schemeClr>
+                </a:solidFill>
+              </a:rPr>
+              <a:t>Machine Learning </a:t>
+            </a:r>
+            <a:r>
+              <a:rPr lang="en-US" dirty="0">
+                <a:solidFill>
+                  <a:schemeClr val="bg1">
+                    <a:lumMod val="85000"/>
+                  </a:schemeClr>
+                </a:solidFill>
+              </a:rPr>
+              <a:t>Internship</a:t>
             </a:r>
           </a:p>
         </p:txBody>
@@ -4372,8 +4397,8 @@
           </a:p>
         </p:txBody>
       </p:sp>
-      <mc:AlternateContent xmlns:mc="http://schemas.openxmlformats.org/markup-compatibility/2006">
-        <mc:Choice xmlns:p14="http://schemas.microsoft.com/office/powerpoint/2010/main" Requires="p14">
+      <mc:AlternateContent xmlns:mc="http://schemas.openxmlformats.org/markup-compatibility/2006" xmlns:p14="http://schemas.microsoft.com/office/powerpoint/2010/main">
+        <mc:Choice Requires="p14">
           <p:contentPart p14:bwMode="auto" r:id="rId2">
             <p14:nvContentPartPr>
               <p14:cNvPr id="5" name="Ink 4">
@@ -4392,7 +4417,7 @@
             </p14:xfrm>
           </p:contentPart>
         </mc:Choice>
-        <mc:Fallback>
+        <mc:Fallback xmlns="">
           <p:pic>
             <p:nvPicPr>
               <p:cNvPr id="5" name="Ink 4">
@@ -4443,8 +4468,8 @@
             <a:chExt cx="360" cy="360"/>
           </a:xfrm>
         </p:grpSpPr>
-        <mc:AlternateContent xmlns:mc="http://schemas.openxmlformats.org/markup-compatibility/2006">
-          <mc:Choice xmlns:p14="http://schemas.microsoft.com/office/powerpoint/2010/main" Requires="p14">
+        <mc:AlternateContent xmlns:mc="http://schemas.openxmlformats.org/markup-compatibility/2006" xmlns:p14="http://schemas.microsoft.com/office/powerpoint/2010/main">
+          <mc:Choice Requires="p14">
             <p:contentPart p14:bwMode="auto" r:id="rId4">
               <p14:nvContentPartPr>
                 <p14:cNvPr id="7" name="Ink 6">
@@ -4463,7 +4488,7 @@
               </p14:xfrm>
             </p:contentPart>
           </mc:Choice>
-          <mc:Fallback>
+          <mc:Fallback xmlns="">
             <p:pic>
               <p:nvPicPr>
                 <p:cNvPr id="7" name="Ink 6">
@@ -4494,8 +4519,8 @@
             </p:pic>
           </mc:Fallback>
         </mc:AlternateContent>
-        <mc:AlternateContent xmlns:mc="http://schemas.openxmlformats.org/markup-compatibility/2006">
-          <mc:Choice xmlns:p14="http://schemas.microsoft.com/office/powerpoint/2010/main" Requires="p14">
+        <mc:AlternateContent xmlns:mc="http://schemas.openxmlformats.org/markup-compatibility/2006" xmlns:p14="http://schemas.microsoft.com/office/powerpoint/2010/main">
+          <mc:Choice Requires="p14">
             <p:contentPart p14:bwMode="auto" r:id="rId5">
               <p14:nvContentPartPr>
                 <p14:cNvPr id="8" name="Ink 7">
@@ -4514,7 +4539,7 @@
               </p14:xfrm>
             </p:contentPart>
           </mc:Choice>
-          <mc:Fallback>
+          <mc:Fallback xmlns="">
             <p:pic>
               <p:nvPicPr>
                 <p:cNvPr id="8" name="Ink 7">
@@ -4546,8 +4571,8 @@
           </mc:Fallback>
         </mc:AlternateContent>
       </p:grpSp>
-      <mc:AlternateContent xmlns:mc="http://schemas.openxmlformats.org/markup-compatibility/2006">
-        <mc:Choice xmlns:p14="http://schemas.microsoft.com/office/powerpoint/2010/main" Requires="p14">
+      <mc:AlternateContent xmlns:mc="http://schemas.openxmlformats.org/markup-compatibility/2006" xmlns:p14="http://schemas.microsoft.com/office/powerpoint/2010/main">
+        <mc:Choice Requires="p14">
           <p:contentPart p14:bwMode="auto" r:id="rId6">
             <p14:nvContentPartPr>
               <p14:cNvPr id="9" name="Ink 8">
@@ -4566,7 +4591,7 @@
             </p14:xfrm>
           </p:contentPart>
         </mc:Choice>
-        <mc:Fallback>
+        <mc:Fallback xmlns="">
           <p:pic>
             <p:nvPicPr>
               <p:cNvPr id="9" name="Ink 8">
@@ -4754,7 +4779,7 @@
                   </a:schemeClr>
                 </a:solidFill>
               </a:rPr>
-              <a:t>Used both level set based (*) and maximum flow based(*) solution techniques for this optimization problem</a:t>
+              <a:t>Used both level set based and maximum flow based solution techniques for this optimization problem</a:t>
             </a:r>
           </a:p>
         </p:txBody>

</xml_diff>